<commit_message>
add to qna final
</commit_message>
<xml_diff>
--- a/pro01.pptx
+++ b/pro01.pptx
@@ -289,7 +289,7 @@
           <a:p>
             <a:fld id="{777C6190-F7A8-4043-83B7-687FE88626FC}" type="datetimeFigureOut">
               <a:rPr lang="ko-KR" altLang="en-US" smtClean="0"/>
-              <a:t>2023-08-07</a:t>
+              <a:t>2023-08-08</a:t>
             </a:fld>
             <a:endParaRPr lang="ko-KR" altLang="en-US"/>
           </a:p>
@@ -459,7 +459,7 @@
           <a:p>
             <a:fld id="{777C6190-F7A8-4043-83B7-687FE88626FC}" type="datetimeFigureOut">
               <a:rPr lang="ko-KR" altLang="en-US" smtClean="0"/>
-              <a:t>2023-08-07</a:t>
+              <a:t>2023-08-08</a:t>
             </a:fld>
             <a:endParaRPr lang="ko-KR" altLang="en-US"/>
           </a:p>
@@ -639,7 +639,7 @@
           <a:p>
             <a:fld id="{777C6190-F7A8-4043-83B7-687FE88626FC}" type="datetimeFigureOut">
               <a:rPr lang="ko-KR" altLang="en-US" smtClean="0"/>
-              <a:t>2023-08-07</a:t>
+              <a:t>2023-08-08</a:t>
             </a:fld>
             <a:endParaRPr lang="ko-KR" altLang="en-US"/>
           </a:p>
@@ -809,7 +809,7 @@
           <a:p>
             <a:fld id="{777C6190-F7A8-4043-83B7-687FE88626FC}" type="datetimeFigureOut">
               <a:rPr lang="ko-KR" altLang="en-US" smtClean="0"/>
-              <a:t>2023-08-07</a:t>
+              <a:t>2023-08-08</a:t>
             </a:fld>
             <a:endParaRPr lang="ko-KR" altLang="en-US"/>
           </a:p>
@@ -1055,7 +1055,7 @@
           <a:p>
             <a:fld id="{777C6190-F7A8-4043-83B7-687FE88626FC}" type="datetimeFigureOut">
               <a:rPr lang="ko-KR" altLang="en-US" smtClean="0"/>
-              <a:t>2023-08-07</a:t>
+              <a:t>2023-08-08</a:t>
             </a:fld>
             <a:endParaRPr lang="ko-KR" altLang="en-US"/>
           </a:p>
@@ -1343,7 +1343,7 @@
           <a:p>
             <a:fld id="{777C6190-F7A8-4043-83B7-687FE88626FC}" type="datetimeFigureOut">
               <a:rPr lang="ko-KR" altLang="en-US" smtClean="0"/>
-              <a:t>2023-08-07</a:t>
+              <a:t>2023-08-08</a:t>
             </a:fld>
             <a:endParaRPr lang="ko-KR" altLang="en-US"/>
           </a:p>
@@ -1765,7 +1765,7 @@
           <a:p>
             <a:fld id="{777C6190-F7A8-4043-83B7-687FE88626FC}" type="datetimeFigureOut">
               <a:rPr lang="ko-KR" altLang="en-US" smtClean="0"/>
-              <a:t>2023-08-07</a:t>
+              <a:t>2023-08-08</a:t>
             </a:fld>
             <a:endParaRPr lang="ko-KR" altLang="en-US"/>
           </a:p>
@@ -1883,7 +1883,7 @@
           <a:p>
             <a:fld id="{777C6190-F7A8-4043-83B7-687FE88626FC}" type="datetimeFigureOut">
               <a:rPr lang="ko-KR" altLang="en-US" smtClean="0"/>
-              <a:t>2023-08-07</a:t>
+              <a:t>2023-08-08</a:t>
             </a:fld>
             <a:endParaRPr lang="ko-KR" altLang="en-US"/>
           </a:p>
@@ -1978,7 +1978,7 @@
           <a:p>
             <a:fld id="{777C6190-F7A8-4043-83B7-687FE88626FC}" type="datetimeFigureOut">
               <a:rPr lang="ko-KR" altLang="en-US" smtClean="0"/>
-              <a:t>2023-08-07</a:t>
+              <a:t>2023-08-08</a:t>
             </a:fld>
             <a:endParaRPr lang="ko-KR" altLang="en-US"/>
           </a:p>
@@ -2255,7 +2255,7 @@
           <a:p>
             <a:fld id="{777C6190-F7A8-4043-83B7-687FE88626FC}" type="datetimeFigureOut">
               <a:rPr lang="ko-KR" altLang="en-US" smtClean="0"/>
-              <a:t>2023-08-07</a:t>
+              <a:t>2023-08-08</a:t>
             </a:fld>
             <a:endParaRPr lang="ko-KR" altLang="en-US"/>
           </a:p>
@@ -2508,7 +2508,7 @@
           <a:p>
             <a:fld id="{777C6190-F7A8-4043-83B7-687FE88626FC}" type="datetimeFigureOut">
               <a:rPr lang="ko-KR" altLang="en-US" smtClean="0"/>
-              <a:t>2023-08-07</a:t>
+              <a:t>2023-08-08</a:t>
             </a:fld>
             <a:endParaRPr lang="ko-KR" altLang="en-US"/>
           </a:p>
@@ -2721,7 +2721,7 @@
           <a:p>
             <a:fld id="{777C6190-F7A8-4043-83B7-687FE88626FC}" type="datetimeFigureOut">
               <a:rPr lang="ko-KR" altLang="en-US" smtClean="0"/>
-              <a:t>2023-08-07</a:t>
+              <a:t>2023-08-08</a:t>
             </a:fld>
             <a:endParaRPr lang="ko-KR" altLang="en-US"/>
           </a:p>
@@ -4225,6 +4225,44 @@
           </a:p>
         </p:txBody>
       </p:sp>
+      <p:sp>
+        <p:nvSpPr>
+          <p:cNvPr id="2" name="TextBox 1"/>
+          <p:cNvSpPr txBox="1"/>
+          <p:nvPr/>
+        </p:nvSpPr>
+        <p:spPr>
+          <a:xfrm>
+            <a:off x="3713448" y="6021288"/>
+            <a:ext cx="1415772" cy="461665"/>
+          </a:xfrm>
+          <a:prstGeom prst="rect">
+            <a:avLst/>
+          </a:prstGeom>
+          <a:noFill/>
+        </p:spPr>
+        <p:txBody>
+          <a:bodyPr wrap="none" rtlCol="0">
+            <a:spAutoFit/>
+          </a:bodyPr>
+          <a:lstStyle/>
+          <a:p>
+            <a:r>
+              <a:rPr lang="ko-KR" altLang="en-US" sz="2400" b="1" smtClean="0">
+                <a:solidFill>
+                  <a:srgbClr val="FF0000"/>
+                </a:solidFill>
+              </a:rPr>
+              <a:t>공지사항</a:t>
+            </a:r>
+            <a:endParaRPr lang="ko-KR" altLang="en-US" sz="2400" b="1">
+              <a:solidFill>
+                <a:srgbClr val="FF0000"/>
+              </a:solidFill>
+            </a:endParaRPr>
+          </a:p>
+        </p:txBody>
+      </p:sp>
     </p:spTree>
     <p:extLst>
       <p:ext uri="{BB962C8B-B14F-4D97-AF65-F5344CB8AC3E}">
@@ -4294,9 +4332,1052 @@
           </a:p>
         </p:txBody>
       </p:sp>
+      <p:cxnSp>
+        <p:nvCxnSpPr>
+          <p:cNvPr id="4" name="꺾인 연결선 3"/>
+          <p:cNvCxnSpPr>
+            <a:endCxn id="5" idx="0"/>
+          </p:cNvCxnSpPr>
+          <p:nvPr/>
+        </p:nvCxnSpPr>
+        <p:spPr>
+          <a:xfrm rot="10800000">
+            <a:off x="970830" y="2838642"/>
+            <a:ext cx="7399541" cy="3263592"/>
+          </a:xfrm>
+          <a:prstGeom prst="bentConnector4">
+            <a:avLst>
+              <a:gd name="adj1" fmla="val -4328"/>
+              <a:gd name="adj2" fmla="val 145697"/>
+            </a:avLst>
+          </a:prstGeom>
+          <a:ln>
+            <a:tailEnd type="triangle" w="med" len="lg"/>
+          </a:ln>
+        </p:spPr>
+        <p:style>
+          <a:lnRef idx="3">
+            <a:schemeClr val="accent3"/>
+          </a:lnRef>
+          <a:fillRef idx="0">
+            <a:schemeClr val="accent3"/>
+          </a:fillRef>
+          <a:effectRef idx="2">
+            <a:schemeClr val="accent3"/>
+          </a:effectRef>
+          <a:fontRef idx="minor">
+            <a:schemeClr val="tx1"/>
+          </a:fontRef>
+        </p:style>
+      </p:cxnSp>
+      <p:sp>
+        <p:nvSpPr>
+          <p:cNvPr id="5" name="직사각형 4"/>
+          <p:cNvSpPr/>
+          <p:nvPr/>
+        </p:nvSpPr>
+        <p:spPr>
+          <a:xfrm>
+            <a:off x="106733" y="2838642"/>
+            <a:ext cx="1728192" cy="432048"/>
+          </a:xfrm>
+          <a:prstGeom prst="rect">
+            <a:avLst/>
+          </a:prstGeom>
+        </p:spPr>
+        <p:style>
+          <a:lnRef idx="2">
+            <a:schemeClr val="accent3">
+              <a:shade val="50000"/>
+            </a:schemeClr>
+          </a:lnRef>
+          <a:fillRef idx="1">
+            <a:schemeClr val="accent3"/>
+          </a:fillRef>
+          <a:effectRef idx="0">
+            <a:schemeClr val="accent3"/>
+          </a:effectRef>
+          <a:fontRef idx="minor">
+            <a:schemeClr val="lt1"/>
+          </a:fontRef>
+        </p:style>
+        <p:txBody>
+          <a:bodyPr rtlCol="0" anchor="ctr"/>
+          <a:lstStyle/>
+          <a:p>
+            <a:pPr algn="ctr"/>
+            <a:r>
+              <a:rPr lang="en-US" altLang="ko-KR" sz="1600" dirty="0" err="1" smtClean="0"/>
+              <a:t>qnaList.jsp</a:t>
+            </a:r>
+            <a:endParaRPr lang="ko-KR" altLang="en-US" sz="1600" dirty="0"/>
+          </a:p>
+        </p:txBody>
+      </p:sp>
+      <p:sp>
+        <p:nvSpPr>
+          <p:cNvPr id="6" name="직사각형 5"/>
+          <p:cNvSpPr/>
+          <p:nvPr/>
+        </p:nvSpPr>
+        <p:spPr>
+          <a:xfrm>
+            <a:off x="2195736" y="1760639"/>
+            <a:ext cx="2232248" cy="432048"/>
+          </a:xfrm>
+          <a:prstGeom prst="rect">
+            <a:avLst/>
+          </a:prstGeom>
+        </p:spPr>
+        <p:style>
+          <a:lnRef idx="2">
+            <a:schemeClr val="accent1">
+              <a:shade val="50000"/>
+            </a:schemeClr>
+          </a:lnRef>
+          <a:fillRef idx="1">
+            <a:schemeClr val="accent1"/>
+          </a:fillRef>
+          <a:effectRef idx="0">
+            <a:schemeClr val="accent1"/>
+          </a:effectRef>
+          <a:fontRef idx="minor">
+            <a:schemeClr val="lt1"/>
+          </a:fontRef>
+        </p:style>
+        <p:txBody>
+          <a:bodyPr rtlCol="0" anchor="ctr"/>
+          <a:lstStyle/>
+          <a:p>
+            <a:pPr algn="ctr"/>
+            <a:r>
+              <a:rPr lang="en-US" altLang="ko-KR" sz="1600" dirty="0" err="1" smtClean="0"/>
+              <a:t>addQuestion.jsp</a:t>
+            </a:r>
+            <a:endParaRPr lang="ko-KR" altLang="en-US" sz="1600" dirty="0"/>
+          </a:p>
+        </p:txBody>
+      </p:sp>
+      <p:sp>
+        <p:nvSpPr>
+          <p:cNvPr id="7" name="직사각형 6"/>
+          <p:cNvSpPr/>
+          <p:nvPr/>
+        </p:nvSpPr>
+        <p:spPr>
+          <a:xfrm>
+            <a:off x="5220072" y="1760639"/>
+            <a:ext cx="2232248" cy="432048"/>
+          </a:xfrm>
+          <a:prstGeom prst="rect">
+            <a:avLst/>
+          </a:prstGeom>
+        </p:spPr>
+        <p:style>
+          <a:lnRef idx="2">
+            <a:schemeClr val="accent1">
+              <a:shade val="50000"/>
+            </a:schemeClr>
+          </a:lnRef>
+          <a:fillRef idx="1">
+            <a:schemeClr val="accent1"/>
+          </a:fillRef>
+          <a:effectRef idx="0">
+            <a:schemeClr val="accent1"/>
+          </a:effectRef>
+          <a:fontRef idx="minor">
+            <a:schemeClr val="lt1"/>
+          </a:fontRef>
+        </p:style>
+        <p:txBody>
+          <a:bodyPr rtlCol="0" anchor="ctr"/>
+          <a:lstStyle/>
+          <a:p>
+            <a:pPr algn="ctr"/>
+            <a:r>
+              <a:rPr lang="en-US" altLang="ko-KR" sz="1600" dirty="0" err="1" smtClean="0"/>
+              <a:t>addQuestionPro.jsp</a:t>
+            </a:r>
+            <a:endParaRPr lang="ko-KR" altLang="en-US" sz="1600" dirty="0"/>
+          </a:p>
+        </p:txBody>
+      </p:sp>
+      <p:sp>
+        <p:nvSpPr>
+          <p:cNvPr id="8" name="원통 7"/>
+          <p:cNvSpPr/>
+          <p:nvPr/>
+        </p:nvSpPr>
+        <p:spPr>
+          <a:xfrm>
+            <a:off x="8316416" y="2924944"/>
+            <a:ext cx="720080" cy="3312368"/>
+          </a:xfrm>
+          <a:prstGeom prst="can">
+            <a:avLst/>
+          </a:prstGeom>
+        </p:spPr>
+        <p:style>
+          <a:lnRef idx="2">
+            <a:schemeClr val="accent3">
+              <a:shade val="50000"/>
+            </a:schemeClr>
+          </a:lnRef>
+          <a:fillRef idx="1">
+            <a:schemeClr val="accent3"/>
+          </a:fillRef>
+          <a:effectRef idx="0">
+            <a:schemeClr val="accent3"/>
+          </a:effectRef>
+          <a:fontRef idx="minor">
+            <a:schemeClr val="lt1"/>
+          </a:fontRef>
+        </p:style>
+        <p:txBody>
+          <a:bodyPr rtlCol="0" anchor="ctr"/>
+          <a:lstStyle/>
+          <a:p>
+            <a:pPr algn="ctr"/>
+            <a:endParaRPr lang="ko-KR" altLang="en-US" dirty="0"/>
+          </a:p>
+        </p:txBody>
+      </p:sp>
+      <p:cxnSp>
+        <p:nvCxnSpPr>
+          <p:cNvPr id="9" name="직선 화살표 연결선 8"/>
+          <p:cNvCxnSpPr>
+            <a:stCxn id="5" idx="0"/>
+            <a:endCxn id="6" idx="1"/>
+          </p:cNvCxnSpPr>
+          <p:nvPr/>
+        </p:nvCxnSpPr>
+        <p:spPr>
+          <a:xfrm flipV="1">
+            <a:off x="970829" y="1976663"/>
+            <a:ext cx="1224907" cy="861979"/>
+          </a:xfrm>
+          <a:prstGeom prst="straightConnector1">
+            <a:avLst/>
+          </a:prstGeom>
+          <a:ln>
+            <a:tailEnd type="triangle" w="med" len="lg"/>
+          </a:ln>
+        </p:spPr>
+        <p:style>
+          <a:lnRef idx="3">
+            <a:schemeClr val="accent1"/>
+          </a:lnRef>
+          <a:fillRef idx="0">
+            <a:schemeClr val="accent1"/>
+          </a:fillRef>
+          <a:effectRef idx="2">
+            <a:schemeClr val="accent1"/>
+          </a:effectRef>
+          <a:fontRef idx="minor">
+            <a:schemeClr val="tx1"/>
+          </a:fontRef>
+        </p:style>
+      </p:cxnSp>
+      <p:cxnSp>
+        <p:nvCxnSpPr>
+          <p:cNvPr id="10" name="직선 화살표 연결선 9"/>
+          <p:cNvCxnSpPr>
+            <a:stCxn id="6" idx="3"/>
+            <a:endCxn id="7" idx="1"/>
+          </p:cNvCxnSpPr>
+          <p:nvPr/>
+        </p:nvCxnSpPr>
+        <p:spPr>
+          <a:xfrm>
+            <a:off x="4427984" y="1976663"/>
+            <a:ext cx="792088" cy="0"/>
+          </a:xfrm>
+          <a:prstGeom prst="straightConnector1">
+            <a:avLst/>
+          </a:prstGeom>
+          <a:ln>
+            <a:tailEnd type="triangle" w="med" len="lg"/>
+          </a:ln>
+        </p:spPr>
+        <p:style>
+          <a:lnRef idx="3">
+            <a:schemeClr val="accent1"/>
+          </a:lnRef>
+          <a:fillRef idx="0">
+            <a:schemeClr val="accent1"/>
+          </a:fillRef>
+          <a:effectRef idx="2">
+            <a:schemeClr val="accent1"/>
+          </a:effectRef>
+          <a:fontRef idx="minor">
+            <a:schemeClr val="tx1"/>
+          </a:fontRef>
+        </p:style>
+      </p:cxnSp>
+      <p:cxnSp>
+        <p:nvCxnSpPr>
+          <p:cNvPr id="11" name="직선 화살표 연결선 10"/>
+          <p:cNvCxnSpPr>
+            <a:stCxn id="7" idx="3"/>
+          </p:cNvCxnSpPr>
+          <p:nvPr/>
+        </p:nvCxnSpPr>
+        <p:spPr>
+          <a:xfrm>
+            <a:off x="7452320" y="1976663"/>
+            <a:ext cx="864096" cy="1166707"/>
+          </a:xfrm>
+          <a:prstGeom prst="straightConnector1">
+            <a:avLst/>
+          </a:prstGeom>
+          <a:ln>
+            <a:tailEnd type="triangle" w="med" len="lg"/>
+          </a:ln>
+        </p:spPr>
+        <p:style>
+          <a:lnRef idx="3">
+            <a:schemeClr val="accent1"/>
+          </a:lnRef>
+          <a:fillRef idx="0">
+            <a:schemeClr val="accent1"/>
+          </a:fillRef>
+          <a:effectRef idx="2">
+            <a:schemeClr val="accent1"/>
+          </a:effectRef>
+          <a:fontRef idx="minor">
+            <a:schemeClr val="tx1"/>
+          </a:fontRef>
+        </p:style>
+      </p:cxnSp>
+      <p:sp>
+        <p:nvSpPr>
+          <p:cNvPr id="12" name="TextBox 11"/>
+          <p:cNvSpPr txBox="1"/>
+          <p:nvPr/>
+        </p:nvSpPr>
+        <p:spPr>
+          <a:xfrm>
+            <a:off x="4498654" y="1547500"/>
+            <a:ext cx="577402" cy="369332"/>
+          </a:xfrm>
+          <a:prstGeom prst="rect">
+            <a:avLst/>
+          </a:prstGeom>
+          <a:noFill/>
+        </p:spPr>
+        <p:txBody>
+          <a:bodyPr wrap="none" rtlCol="0">
+            <a:spAutoFit/>
+          </a:bodyPr>
+          <a:lstStyle/>
+          <a:p>
+            <a:r>
+              <a:rPr lang="en-US" altLang="ko-KR" dirty="0" err="1" smtClean="0"/>
+              <a:t>qna</a:t>
+            </a:r>
+            <a:endParaRPr lang="ko-KR" altLang="en-US" dirty="0"/>
+          </a:p>
+        </p:txBody>
+      </p:sp>
+      <p:sp>
+        <p:nvSpPr>
+          <p:cNvPr id="13" name="TextBox 12"/>
+          <p:cNvSpPr txBox="1"/>
+          <p:nvPr/>
+        </p:nvSpPr>
+        <p:spPr>
+          <a:xfrm rot="3176174">
+            <a:off x="7694652" y="2098053"/>
+            <a:ext cx="577402" cy="369332"/>
+          </a:xfrm>
+          <a:prstGeom prst="rect">
+            <a:avLst/>
+          </a:prstGeom>
+          <a:noFill/>
+        </p:spPr>
+        <p:txBody>
+          <a:bodyPr wrap="none" rtlCol="0">
+            <a:spAutoFit/>
+          </a:bodyPr>
+          <a:lstStyle/>
+          <a:p>
+            <a:r>
+              <a:rPr lang="en-US" altLang="ko-KR" dirty="0" err="1" smtClean="0"/>
+              <a:t>qna</a:t>
+            </a:r>
+            <a:endParaRPr lang="ko-KR" altLang="en-US" dirty="0"/>
+          </a:p>
+        </p:txBody>
+      </p:sp>
+      <p:sp>
+        <p:nvSpPr>
+          <p:cNvPr id="14" name="직사각형 13"/>
+          <p:cNvSpPr/>
+          <p:nvPr/>
+        </p:nvSpPr>
+        <p:spPr>
+          <a:xfrm>
+            <a:off x="2483768" y="3645024"/>
+            <a:ext cx="1656184" cy="432048"/>
+          </a:xfrm>
+          <a:prstGeom prst="rect">
+            <a:avLst/>
+          </a:prstGeom>
+        </p:spPr>
+        <p:style>
+          <a:lnRef idx="2">
+            <a:schemeClr val="accent6">
+              <a:shade val="50000"/>
+            </a:schemeClr>
+          </a:lnRef>
+          <a:fillRef idx="1">
+            <a:schemeClr val="accent6"/>
+          </a:fillRef>
+          <a:effectRef idx="0">
+            <a:schemeClr val="accent6"/>
+          </a:effectRef>
+          <a:fontRef idx="minor">
+            <a:schemeClr val="lt1"/>
+          </a:fontRef>
+        </p:style>
+        <p:txBody>
+          <a:bodyPr rtlCol="0" anchor="ctr"/>
+          <a:lstStyle/>
+          <a:p>
+            <a:pPr algn="ctr"/>
+            <a:r>
+              <a:rPr lang="en-US" altLang="ko-KR" sz="1600" dirty="0" err="1" smtClean="0"/>
+              <a:t>getQna.jsp</a:t>
+            </a:r>
+            <a:endParaRPr lang="ko-KR" altLang="en-US" sz="1600" dirty="0"/>
+          </a:p>
+        </p:txBody>
+      </p:sp>
+      <p:sp>
+        <p:nvSpPr>
+          <p:cNvPr id="15" name="직사각형 14"/>
+          <p:cNvSpPr/>
+          <p:nvPr/>
+        </p:nvSpPr>
+        <p:spPr>
+          <a:xfrm>
+            <a:off x="2915816" y="4581128"/>
+            <a:ext cx="1800200" cy="432048"/>
+          </a:xfrm>
+          <a:prstGeom prst="rect">
+            <a:avLst/>
+          </a:prstGeom>
+        </p:spPr>
+        <p:style>
+          <a:lnRef idx="2">
+            <a:schemeClr val="accent4">
+              <a:shade val="50000"/>
+            </a:schemeClr>
+          </a:lnRef>
+          <a:fillRef idx="1">
+            <a:schemeClr val="accent4"/>
+          </a:fillRef>
+          <a:effectRef idx="0">
+            <a:schemeClr val="accent4"/>
+          </a:effectRef>
+          <a:fontRef idx="minor">
+            <a:schemeClr val="lt1"/>
+          </a:fontRef>
+        </p:style>
+        <p:txBody>
+          <a:bodyPr rtlCol="0" anchor="ctr"/>
+          <a:lstStyle/>
+          <a:p>
+            <a:pPr algn="ctr"/>
+            <a:r>
+              <a:rPr lang="en-US" altLang="ko-KR" sz="1600" dirty="0" err="1" smtClean="0"/>
+              <a:t>updateQna.jsp</a:t>
+            </a:r>
+            <a:endParaRPr lang="ko-KR" altLang="en-US" sz="1600" dirty="0"/>
+          </a:p>
+        </p:txBody>
+      </p:sp>
+      <p:sp>
+        <p:nvSpPr>
+          <p:cNvPr id="16" name="직사각형 15"/>
+          <p:cNvSpPr/>
+          <p:nvPr/>
+        </p:nvSpPr>
+        <p:spPr>
+          <a:xfrm>
+            <a:off x="971600" y="5373216"/>
+            <a:ext cx="1656184" cy="432048"/>
+          </a:xfrm>
+          <a:prstGeom prst="rect">
+            <a:avLst/>
+          </a:prstGeom>
+        </p:spPr>
+        <p:style>
+          <a:lnRef idx="2">
+            <a:schemeClr val="dk1">
+              <a:shade val="50000"/>
+            </a:schemeClr>
+          </a:lnRef>
+          <a:fillRef idx="1">
+            <a:schemeClr val="dk1"/>
+          </a:fillRef>
+          <a:effectRef idx="0">
+            <a:schemeClr val="dk1"/>
+          </a:effectRef>
+          <a:fontRef idx="minor">
+            <a:schemeClr val="lt1"/>
+          </a:fontRef>
+        </p:style>
+        <p:txBody>
+          <a:bodyPr rtlCol="0" anchor="ctr"/>
+          <a:lstStyle/>
+          <a:p>
+            <a:pPr algn="ctr"/>
+            <a:r>
+              <a:rPr lang="en-US" altLang="ko-KR" sz="1600" dirty="0" err="1" smtClean="0"/>
+              <a:t>delQna.jsp</a:t>
+            </a:r>
+            <a:endParaRPr lang="ko-KR" altLang="en-US" sz="1600" dirty="0"/>
+          </a:p>
+        </p:txBody>
+      </p:sp>
+      <p:cxnSp>
+        <p:nvCxnSpPr>
+          <p:cNvPr id="17" name="직선 화살표 연결선 16"/>
+          <p:cNvCxnSpPr>
+            <a:stCxn id="14" idx="2"/>
+          </p:cNvCxnSpPr>
+          <p:nvPr/>
+        </p:nvCxnSpPr>
+        <p:spPr>
+          <a:xfrm>
+            <a:off x="3311860" y="4077072"/>
+            <a:ext cx="0" cy="504056"/>
+          </a:xfrm>
+          <a:prstGeom prst="straightConnector1">
+            <a:avLst/>
+          </a:prstGeom>
+          <a:ln>
+            <a:tailEnd type="triangle" w="med" len="lg"/>
+          </a:ln>
+        </p:spPr>
+        <p:style>
+          <a:lnRef idx="3">
+            <a:schemeClr val="accent4"/>
+          </a:lnRef>
+          <a:fillRef idx="0">
+            <a:schemeClr val="accent4"/>
+          </a:fillRef>
+          <a:effectRef idx="2">
+            <a:schemeClr val="accent4"/>
+          </a:effectRef>
+          <a:fontRef idx="minor">
+            <a:schemeClr val="tx1"/>
+          </a:fontRef>
+        </p:style>
+      </p:cxnSp>
+      <p:sp>
+        <p:nvSpPr>
+          <p:cNvPr id="18" name="직사각형 17"/>
+          <p:cNvSpPr/>
+          <p:nvPr/>
+        </p:nvSpPr>
+        <p:spPr>
+          <a:xfrm>
+            <a:off x="5508104" y="4581128"/>
+            <a:ext cx="2160240" cy="432048"/>
+          </a:xfrm>
+          <a:prstGeom prst="rect">
+            <a:avLst/>
+          </a:prstGeom>
+        </p:spPr>
+        <p:style>
+          <a:lnRef idx="2">
+            <a:schemeClr val="accent4">
+              <a:shade val="50000"/>
+            </a:schemeClr>
+          </a:lnRef>
+          <a:fillRef idx="1">
+            <a:schemeClr val="accent4"/>
+          </a:fillRef>
+          <a:effectRef idx="0">
+            <a:schemeClr val="accent4"/>
+          </a:effectRef>
+          <a:fontRef idx="minor">
+            <a:schemeClr val="lt1"/>
+          </a:fontRef>
+        </p:style>
+        <p:txBody>
+          <a:bodyPr rtlCol="0" anchor="ctr"/>
+          <a:lstStyle/>
+          <a:p>
+            <a:pPr algn="ctr"/>
+            <a:r>
+              <a:rPr lang="en-US" altLang="ko-KR" sz="1600" dirty="0" err="1" smtClean="0"/>
+              <a:t>updateQnaPro.jsp</a:t>
+            </a:r>
+            <a:endParaRPr lang="ko-KR" altLang="en-US" sz="1600" dirty="0"/>
+          </a:p>
+        </p:txBody>
+      </p:sp>
+      <p:cxnSp>
+        <p:nvCxnSpPr>
+          <p:cNvPr id="19" name="직선 화살표 연결선 18"/>
+          <p:cNvCxnSpPr>
+            <a:stCxn id="15" idx="3"/>
+            <a:endCxn id="18" idx="1"/>
+          </p:cNvCxnSpPr>
+          <p:nvPr/>
+        </p:nvCxnSpPr>
+        <p:spPr>
+          <a:xfrm>
+            <a:off x="4716016" y="4797152"/>
+            <a:ext cx="792088" cy="0"/>
+          </a:xfrm>
+          <a:prstGeom prst="straightConnector1">
+            <a:avLst/>
+          </a:prstGeom>
+          <a:ln>
+            <a:tailEnd type="triangle" w="med" len="lg"/>
+          </a:ln>
+        </p:spPr>
+        <p:style>
+          <a:lnRef idx="3">
+            <a:schemeClr val="accent4"/>
+          </a:lnRef>
+          <a:fillRef idx="0">
+            <a:schemeClr val="accent4"/>
+          </a:fillRef>
+          <a:effectRef idx="2">
+            <a:schemeClr val="accent4"/>
+          </a:effectRef>
+          <a:fontRef idx="minor">
+            <a:schemeClr val="tx1"/>
+          </a:fontRef>
+        </p:style>
+      </p:cxnSp>
+      <p:cxnSp>
+        <p:nvCxnSpPr>
+          <p:cNvPr id="20" name="직선 화살표 연결선 19"/>
+          <p:cNvCxnSpPr>
+            <a:stCxn id="18" idx="3"/>
+          </p:cNvCxnSpPr>
+          <p:nvPr/>
+        </p:nvCxnSpPr>
+        <p:spPr>
+          <a:xfrm>
+            <a:off x="7668344" y="4797152"/>
+            <a:ext cx="648072" cy="0"/>
+          </a:xfrm>
+          <a:prstGeom prst="straightConnector1">
+            <a:avLst/>
+          </a:prstGeom>
+          <a:ln>
+            <a:tailEnd type="triangle" w="med" len="lg"/>
+          </a:ln>
+        </p:spPr>
+        <p:style>
+          <a:lnRef idx="3">
+            <a:schemeClr val="accent4"/>
+          </a:lnRef>
+          <a:fillRef idx="0">
+            <a:schemeClr val="accent4"/>
+          </a:fillRef>
+          <a:effectRef idx="2">
+            <a:schemeClr val="accent4"/>
+          </a:effectRef>
+          <a:fontRef idx="minor">
+            <a:schemeClr val="tx1"/>
+          </a:fontRef>
+        </p:style>
+      </p:cxnSp>
+      <p:cxnSp>
+        <p:nvCxnSpPr>
+          <p:cNvPr id="21" name="직선 화살표 연결선 20"/>
+          <p:cNvCxnSpPr>
+            <a:stCxn id="5" idx="3"/>
+            <a:endCxn id="14" idx="1"/>
+          </p:cNvCxnSpPr>
+          <p:nvPr/>
+        </p:nvCxnSpPr>
+        <p:spPr>
+          <a:xfrm>
+            <a:off x="1834925" y="3054666"/>
+            <a:ext cx="648843" cy="806382"/>
+          </a:xfrm>
+          <a:prstGeom prst="straightConnector1">
+            <a:avLst/>
+          </a:prstGeom>
+          <a:ln>
+            <a:tailEnd type="triangle" w="med" len="lg"/>
+          </a:ln>
+        </p:spPr>
+        <p:style>
+          <a:lnRef idx="3">
+            <a:schemeClr val="accent6"/>
+          </a:lnRef>
+          <a:fillRef idx="0">
+            <a:schemeClr val="accent6"/>
+          </a:fillRef>
+          <a:effectRef idx="2">
+            <a:schemeClr val="accent6"/>
+          </a:effectRef>
+          <a:fontRef idx="minor">
+            <a:schemeClr val="tx1"/>
+          </a:fontRef>
+        </p:style>
+      </p:cxnSp>
+      <p:cxnSp>
+        <p:nvCxnSpPr>
+          <p:cNvPr id="22" name="직선 화살표 연결선 21"/>
+          <p:cNvCxnSpPr>
+            <a:stCxn id="14" idx="2"/>
+            <a:endCxn id="16" idx="0"/>
+          </p:cNvCxnSpPr>
+          <p:nvPr/>
+        </p:nvCxnSpPr>
+        <p:spPr>
+          <a:xfrm flipH="1">
+            <a:off x="1799692" y="4077072"/>
+            <a:ext cx="1512168" cy="1296144"/>
+          </a:xfrm>
+          <a:prstGeom prst="straightConnector1">
+            <a:avLst/>
+          </a:prstGeom>
+          <a:ln>
+            <a:tailEnd type="triangle" w="med" len="lg"/>
+          </a:ln>
+        </p:spPr>
+        <p:style>
+          <a:lnRef idx="3">
+            <a:schemeClr val="accent5"/>
+          </a:lnRef>
+          <a:fillRef idx="0">
+            <a:schemeClr val="accent5"/>
+          </a:fillRef>
+          <a:effectRef idx="2">
+            <a:schemeClr val="accent5"/>
+          </a:effectRef>
+          <a:fontRef idx="minor">
+            <a:schemeClr val="tx1"/>
+          </a:fontRef>
+        </p:style>
+      </p:cxnSp>
+      <p:cxnSp>
+        <p:nvCxnSpPr>
+          <p:cNvPr id="23" name="직선 화살표 연결선 22"/>
+          <p:cNvCxnSpPr>
+            <a:stCxn id="16" idx="3"/>
+          </p:cNvCxnSpPr>
+          <p:nvPr/>
+        </p:nvCxnSpPr>
+        <p:spPr>
+          <a:xfrm>
+            <a:off x="2627784" y="5589240"/>
+            <a:ext cx="5688632" cy="0"/>
+          </a:xfrm>
+          <a:prstGeom prst="straightConnector1">
+            <a:avLst/>
+          </a:prstGeom>
+          <a:ln>
+            <a:tailEnd type="triangle" w="med" len="lg"/>
+          </a:ln>
+        </p:spPr>
+        <p:style>
+          <a:lnRef idx="3">
+            <a:schemeClr val="accent5"/>
+          </a:lnRef>
+          <a:fillRef idx="0">
+            <a:schemeClr val="accent5"/>
+          </a:fillRef>
+          <a:effectRef idx="2">
+            <a:schemeClr val="accent5"/>
+          </a:effectRef>
+          <a:fontRef idx="minor">
+            <a:schemeClr val="tx1"/>
+          </a:fontRef>
+        </p:style>
+      </p:cxnSp>
+      <p:cxnSp>
+        <p:nvCxnSpPr>
+          <p:cNvPr id="24" name="직선 화살표 연결선 23"/>
+          <p:cNvCxnSpPr>
+            <a:endCxn id="14" idx="3"/>
+          </p:cNvCxnSpPr>
+          <p:nvPr/>
+        </p:nvCxnSpPr>
+        <p:spPr>
+          <a:xfrm flipH="1" flipV="1">
+            <a:off x="4139952" y="3861048"/>
+            <a:ext cx="4176464" cy="432048"/>
+          </a:xfrm>
+          <a:prstGeom prst="straightConnector1">
+            <a:avLst/>
+          </a:prstGeom>
+          <a:ln>
+            <a:tailEnd type="triangle" w="med" len="lg"/>
+          </a:ln>
+        </p:spPr>
+        <p:style>
+          <a:lnRef idx="3">
+            <a:schemeClr val="accent6"/>
+          </a:lnRef>
+          <a:fillRef idx="0">
+            <a:schemeClr val="accent6"/>
+          </a:fillRef>
+          <a:effectRef idx="2">
+            <a:schemeClr val="accent6"/>
+          </a:effectRef>
+          <a:fontRef idx="minor">
+            <a:schemeClr val="tx1"/>
+          </a:fontRef>
+        </p:style>
+      </p:cxnSp>
+      <p:sp>
+        <p:nvSpPr>
+          <p:cNvPr id="25" name="TextBox 24"/>
+          <p:cNvSpPr txBox="1"/>
+          <p:nvPr/>
+        </p:nvSpPr>
+        <p:spPr>
+          <a:xfrm>
+            <a:off x="4788024" y="4355812"/>
+            <a:ext cx="577402" cy="369332"/>
+          </a:xfrm>
+          <a:prstGeom prst="rect">
+            <a:avLst/>
+          </a:prstGeom>
+          <a:noFill/>
+        </p:spPr>
+        <p:txBody>
+          <a:bodyPr wrap="none" rtlCol="0">
+            <a:spAutoFit/>
+          </a:bodyPr>
+          <a:lstStyle/>
+          <a:p>
+            <a:r>
+              <a:rPr lang="en-US" altLang="ko-KR" dirty="0" err="1" smtClean="0"/>
+              <a:t>qna</a:t>
+            </a:r>
+            <a:endParaRPr lang="ko-KR" altLang="en-US" dirty="0"/>
+          </a:p>
+        </p:txBody>
+      </p:sp>
+      <p:sp>
+        <p:nvSpPr>
+          <p:cNvPr id="26" name="TextBox 25"/>
+          <p:cNvSpPr txBox="1"/>
+          <p:nvPr/>
+        </p:nvSpPr>
+        <p:spPr>
+          <a:xfrm rot="19216907">
+            <a:off x="2101055" y="4356166"/>
+            <a:ext cx="595035" cy="369332"/>
+          </a:xfrm>
+          <a:prstGeom prst="rect">
+            <a:avLst/>
+          </a:prstGeom>
+          <a:noFill/>
+        </p:spPr>
+        <p:txBody>
+          <a:bodyPr wrap="none" rtlCol="0">
+            <a:spAutoFit/>
+          </a:bodyPr>
+          <a:lstStyle/>
+          <a:p>
+            <a:r>
+              <a:rPr lang="en-US" altLang="ko-KR" dirty="0" err="1"/>
+              <a:t>q</a:t>
+            </a:r>
+            <a:r>
+              <a:rPr lang="en-US" altLang="ko-KR" dirty="0" err="1" smtClean="0"/>
+              <a:t>no</a:t>
+            </a:r>
+            <a:endParaRPr lang="ko-KR" altLang="en-US" dirty="0"/>
+          </a:p>
+        </p:txBody>
+      </p:sp>
+      <p:sp>
+        <p:nvSpPr>
+          <p:cNvPr id="27" name="TextBox 26"/>
+          <p:cNvSpPr txBox="1"/>
+          <p:nvPr/>
+        </p:nvSpPr>
+        <p:spPr>
+          <a:xfrm rot="2879415">
+            <a:off x="1994475" y="3116299"/>
+            <a:ext cx="595035" cy="369332"/>
+          </a:xfrm>
+          <a:prstGeom prst="rect">
+            <a:avLst/>
+          </a:prstGeom>
+          <a:noFill/>
+        </p:spPr>
+        <p:txBody>
+          <a:bodyPr wrap="none" rtlCol="0">
+            <a:spAutoFit/>
+          </a:bodyPr>
+          <a:lstStyle/>
+          <a:p>
+            <a:r>
+              <a:rPr lang="en-US" altLang="ko-KR" dirty="0" err="1"/>
+              <a:t>q</a:t>
+            </a:r>
+            <a:r>
+              <a:rPr lang="en-US" altLang="ko-KR" dirty="0" err="1" smtClean="0"/>
+              <a:t>no</a:t>
+            </a:r>
+            <a:endParaRPr lang="ko-KR" altLang="en-US" dirty="0"/>
+          </a:p>
+        </p:txBody>
+      </p:sp>
+      <p:sp>
+        <p:nvSpPr>
+          <p:cNvPr id="28" name="TextBox 27"/>
+          <p:cNvSpPr txBox="1"/>
+          <p:nvPr/>
+        </p:nvSpPr>
+        <p:spPr>
+          <a:xfrm rot="321328">
+            <a:off x="5749996" y="3671432"/>
+            <a:ext cx="577402" cy="369332"/>
+          </a:xfrm>
+          <a:prstGeom prst="rect">
+            <a:avLst/>
+          </a:prstGeom>
+          <a:noFill/>
+        </p:spPr>
+        <p:txBody>
+          <a:bodyPr wrap="none" rtlCol="0">
+            <a:spAutoFit/>
+          </a:bodyPr>
+          <a:lstStyle/>
+          <a:p>
+            <a:r>
+              <a:rPr lang="en-US" altLang="ko-KR" dirty="0" err="1" smtClean="0"/>
+              <a:t>qna</a:t>
+            </a:r>
+            <a:endParaRPr lang="ko-KR" altLang="en-US" dirty="0"/>
+          </a:p>
+        </p:txBody>
+      </p:sp>
+      <p:sp>
+        <p:nvSpPr>
+          <p:cNvPr id="29" name="TextBox 28"/>
+          <p:cNvSpPr txBox="1"/>
+          <p:nvPr/>
+        </p:nvSpPr>
+        <p:spPr>
+          <a:xfrm>
+            <a:off x="4272959" y="917658"/>
+            <a:ext cx="1614545" cy="369332"/>
+          </a:xfrm>
+          <a:prstGeom prst="rect">
+            <a:avLst/>
+          </a:prstGeom>
+          <a:noFill/>
+        </p:spPr>
+        <p:txBody>
+          <a:bodyPr wrap="none" rtlCol="0">
+            <a:spAutoFit/>
+          </a:bodyPr>
+          <a:lstStyle/>
+          <a:p>
+            <a:r>
+              <a:rPr lang="en-US" altLang="ko-KR" dirty="0" err="1" smtClean="0"/>
+              <a:t>ArrayList</a:t>
+            </a:r>
+            <a:r>
+              <a:rPr lang="en-US" altLang="ko-KR" dirty="0" smtClean="0"/>
+              <a:t>(</a:t>
+            </a:r>
+            <a:r>
+              <a:rPr lang="en-US" altLang="ko-KR" dirty="0" err="1"/>
+              <a:t>q</a:t>
+            </a:r>
+            <a:r>
+              <a:rPr lang="en-US" altLang="ko-KR" dirty="0" err="1" smtClean="0"/>
+              <a:t>na</a:t>
+            </a:r>
+            <a:r>
+              <a:rPr lang="en-US" altLang="ko-KR" dirty="0" smtClean="0"/>
+              <a:t>)</a:t>
+            </a:r>
+            <a:endParaRPr lang="ko-KR" altLang="en-US" dirty="0"/>
+          </a:p>
+        </p:txBody>
+      </p:sp>
+      <p:sp>
+        <p:nvSpPr>
+          <p:cNvPr id="30" name="TextBox 29"/>
+          <p:cNvSpPr txBox="1"/>
+          <p:nvPr/>
+        </p:nvSpPr>
+        <p:spPr>
+          <a:xfrm>
+            <a:off x="3563888" y="5219304"/>
+            <a:ext cx="595035" cy="369332"/>
+          </a:xfrm>
+          <a:prstGeom prst="rect">
+            <a:avLst/>
+          </a:prstGeom>
+          <a:noFill/>
+        </p:spPr>
+        <p:txBody>
+          <a:bodyPr wrap="none" rtlCol="0">
+            <a:spAutoFit/>
+          </a:bodyPr>
+          <a:lstStyle/>
+          <a:p>
+            <a:r>
+              <a:rPr lang="en-US" altLang="ko-KR" dirty="0" err="1"/>
+              <a:t>q</a:t>
+            </a:r>
+            <a:r>
+              <a:rPr lang="en-US" altLang="ko-KR" dirty="0" err="1" smtClean="0"/>
+              <a:t>no</a:t>
+            </a:r>
+            <a:endParaRPr lang="ko-KR" altLang="en-US" dirty="0"/>
+          </a:p>
+        </p:txBody>
+      </p:sp>
+      <p:sp>
+        <p:nvSpPr>
+          <p:cNvPr id="31" name="TextBox 30"/>
+          <p:cNvSpPr txBox="1"/>
+          <p:nvPr/>
+        </p:nvSpPr>
+        <p:spPr>
+          <a:xfrm>
+            <a:off x="1259632" y="130938"/>
+            <a:ext cx="6600589" cy="707886"/>
+          </a:xfrm>
+          <a:prstGeom prst="rect">
+            <a:avLst/>
+          </a:prstGeom>
+          <a:noFill/>
+        </p:spPr>
+        <p:txBody>
+          <a:bodyPr wrap="none" rtlCol="0">
+            <a:spAutoFit/>
+          </a:bodyPr>
+          <a:lstStyle/>
+          <a:p>
+            <a:r>
+              <a:rPr lang="ko-KR" altLang="en-US" sz="4000" dirty="0" smtClean="0"/>
+              <a:t>기능 흐름도</a:t>
+            </a:r>
+            <a:r>
+              <a:rPr lang="en-US" altLang="ko-KR" sz="4000" dirty="0" smtClean="0"/>
+              <a:t>(Unit Task Flow)</a:t>
+            </a:r>
+            <a:endParaRPr lang="ko-KR" altLang="en-US" sz="4000" dirty="0"/>
+          </a:p>
+        </p:txBody>
+      </p:sp>
       <p:pic>
         <p:nvPicPr>
-          <p:cNvPr id="2052" name="Picture 4" descr="Amazon RDS for MariaDB – Amazon Web Services(AWS)"/>
+          <p:cNvPr id="32" name="Picture 4" descr="Amazon RDS for MariaDB – Amazon Web Services(AWS)"/>
           <p:cNvPicPr>
             <a:picLocks noChangeAspect="1" noChangeArrowheads="1"/>
           </p:cNvPicPr>
@@ -4317,7 +5398,7 @@
         </p:blipFill>
         <p:spPr bwMode="auto">
           <a:xfrm>
-            <a:off x="1187624" y="1772817"/>
+            <a:off x="8207896" y="5445224"/>
             <a:ext cx="936104" cy="481818"/>
           </a:xfrm>
           <a:prstGeom prst="rect">
@@ -4335,6 +5416,170 @@
           </a:extLst>
         </p:spPr>
       </p:pic>
+      <p:sp>
+        <p:nvSpPr>
+          <p:cNvPr id="33" name="TextBox 32"/>
+          <p:cNvSpPr txBox="1"/>
+          <p:nvPr/>
+        </p:nvSpPr>
+        <p:spPr>
+          <a:xfrm>
+            <a:off x="7668344" y="4356166"/>
+            <a:ext cx="577402" cy="369332"/>
+          </a:xfrm>
+          <a:prstGeom prst="rect">
+            <a:avLst/>
+          </a:prstGeom>
+          <a:noFill/>
+        </p:spPr>
+        <p:txBody>
+          <a:bodyPr wrap="none" rtlCol="0">
+            <a:spAutoFit/>
+          </a:bodyPr>
+          <a:lstStyle/>
+          <a:p>
+            <a:r>
+              <a:rPr lang="en-US" altLang="ko-KR" dirty="0" err="1" smtClean="0"/>
+              <a:t>qna</a:t>
+            </a:r>
+            <a:endParaRPr lang="ko-KR" altLang="en-US" dirty="0"/>
+          </a:p>
+        </p:txBody>
+      </p:sp>
+      <p:sp>
+        <p:nvSpPr>
+          <p:cNvPr id="34" name="TextBox 33"/>
+          <p:cNvSpPr txBox="1"/>
+          <p:nvPr/>
+        </p:nvSpPr>
+        <p:spPr>
+          <a:xfrm>
+            <a:off x="3713448" y="6021288"/>
+            <a:ext cx="1832553" cy="461665"/>
+          </a:xfrm>
+          <a:prstGeom prst="rect">
+            <a:avLst/>
+          </a:prstGeom>
+          <a:noFill/>
+        </p:spPr>
+        <p:txBody>
+          <a:bodyPr wrap="none" rtlCol="0">
+            <a:spAutoFit/>
+          </a:bodyPr>
+          <a:lstStyle/>
+          <a:p>
+            <a:r>
+              <a:rPr lang="ko-KR" altLang="en-US" sz="2400" b="1" dirty="0" smtClean="0">
+                <a:solidFill>
+                  <a:srgbClr val="FF0000"/>
+                </a:solidFill>
+              </a:rPr>
+              <a:t>묻고 답하기</a:t>
+            </a:r>
+            <a:endParaRPr lang="ko-KR" altLang="en-US" sz="2400" b="1" dirty="0">
+              <a:solidFill>
+                <a:srgbClr val="FF0000"/>
+              </a:solidFill>
+            </a:endParaRPr>
+          </a:p>
+        </p:txBody>
+      </p:sp>
+      <p:cxnSp>
+        <p:nvCxnSpPr>
+          <p:cNvPr id="35" name="직선 화살표 연결선 34"/>
+          <p:cNvCxnSpPr>
+            <a:stCxn id="14" idx="0"/>
+            <a:endCxn id="6" idx="2"/>
+          </p:cNvCxnSpPr>
+          <p:nvPr/>
+        </p:nvCxnSpPr>
+        <p:spPr>
+          <a:xfrm flipV="1">
+            <a:off x="3311860" y="2192687"/>
+            <a:ext cx="0" cy="1452337"/>
+          </a:xfrm>
+          <a:prstGeom prst="straightConnector1">
+            <a:avLst/>
+          </a:prstGeom>
+          <a:ln>
+            <a:tailEnd type="triangle" w="med" len="lg"/>
+          </a:ln>
+        </p:spPr>
+        <p:style>
+          <a:lnRef idx="3">
+            <a:schemeClr val="accent2"/>
+          </a:lnRef>
+          <a:fillRef idx="0">
+            <a:schemeClr val="accent2"/>
+          </a:fillRef>
+          <a:effectRef idx="2">
+            <a:schemeClr val="accent2"/>
+          </a:effectRef>
+          <a:fontRef idx="minor">
+            <a:schemeClr val="tx1"/>
+          </a:fontRef>
+        </p:style>
+      </p:cxnSp>
+      <p:sp>
+        <p:nvSpPr>
+          <p:cNvPr id="43" name="TextBox 42"/>
+          <p:cNvSpPr txBox="1"/>
+          <p:nvPr/>
+        </p:nvSpPr>
+        <p:spPr>
+          <a:xfrm>
+            <a:off x="3419872" y="2924944"/>
+            <a:ext cx="764953" cy="369332"/>
+          </a:xfrm>
+          <a:prstGeom prst="rect">
+            <a:avLst/>
+          </a:prstGeom>
+          <a:noFill/>
+        </p:spPr>
+        <p:txBody>
+          <a:bodyPr wrap="none" rtlCol="0">
+            <a:spAutoFit/>
+          </a:bodyPr>
+          <a:lstStyle/>
+          <a:p>
+            <a:r>
+              <a:rPr lang="en-US" altLang="ko-KR" dirty="0" smtClean="0"/>
+              <a:t>lev=1</a:t>
+            </a:r>
+            <a:endParaRPr lang="ko-KR" altLang="en-US" dirty="0"/>
+          </a:p>
+        </p:txBody>
+      </p:sp>
+      <p:sp>
+        <p:nvSpPr>
+          <p:cNvPr id="44" name="TextBox 43"/>
+          <p:cNvSpPr txBox="1"/>
+          <p:nvPr/>
+        </p:nvSpPr>
+        <p:spPr>
+          <a:xfrm rot="19579932">
+            <a:off x="1051387" y="2009622"/>
+            <a:ext cx="764953" cy="369332"/>
+          </a:xfrm>
+          <a:prstGeom prst="rect">
+            <a:avLst/>
+          </a:prstGeom>
+          <a:noFill/>
+        </p:spPr>
+        <p:txBody>
+          <a:bodyPr wrap="none" rtlCol="0">
+            <a:spAutoFit/>
+          </a:bodyPr>
+          <a:lstStyle/>
+          <a:p>
+            <a:r>
+              <a:rPr lang="en-US" altLang="ko-KR" dirty="0" smtClean="0"/>
+              <a:t>lev=0</a:t>
+            </a:r>
+            <a:endParaRPr lang="ko-KR" altLang="en-US" dirty="0"/>
+          </a:p>
+        </p:txBody>
+      </p:sp>
     </p:spTree>
     <p:extLst>
       <p:ext uri="{BB962C8B-B14F-4D97-AF65-F5344CB8AC3E}">

</xml_diff>